<commit_message>
sync to dev (#24)
* update code

* update dependence

* update at 11.29
</commit_message>
<xml_diff>
--- a/doc/FramworkDesign.pptx
+++ b/doc/FramworkDesign.pptx
@@ -8,6 +8,8 @@
     <p:sldId id="256" r:id="rId2"/>
     <p:sldId id="257" r:id="rId3"/>
     <p:sldId id="259" r:id="rId4"/>
+    <p:sldId id="260" r:id="rId5"/>
+    <p:sldId id="261" r:id="rId6"/>
   </p:sldIdLst>
   <p:sldSz cx="12192000" cy="6858000"/>
   <p:notesSz cx="6858000" cy="9144000"/>
@@ -245,7 +247,7 @@
           <a:p>
             <a:fld id="{465E02F3-C158-4F08-9ACA-854467DE1800}" type="datetimeFigureOut">
               <a:rPr lang="zh-CN" altLang="en-US" smtClean="0"/>
-              <a:t>2017/9/16</a:t>
+              <a:t>2017/11/24</a:t>
             </a:fld>
             <a:endParaRPr lang="zh-CN" altLang="en-US"/>
           </a:p>
@@ -415,7 +417,7 @@
           <a:p>
             <a:fld id="{465E02F3-C158-4F08-9ACA-854467DE1800}" type="datetimeFigureOut">
               <a:rPr lang="zh-CN" altLang="en-US" smtClean="0"/>
-              <a:t>2017/9/16</a:t>
+              <a:t>2017/11/24</a:t>
             </a:fld>
             <a:endParaRPr lang="zh-CN" altLang="en-US"/>
           </a:p>
@@ -595,7 +597,7 @@
           <a:p>
             <a:fld id="{465E02F3-C158-4F08-9ACA-854467DE1800}" type="datetimeFigureOut">
               <a:rPr lang="zh-CN" altLang="en-US" smtClean="0"/>
-              <a:t>2017/9/16</a:t>
+              <a:t>2017/11/24</a:t>
             </a:fld>
             <a:endParaRPr lang="zh-CN" altLang="en-US"/>
           </a:p>
@@ -765,7 +767,7 @@
           <a:p>
             <a:fld id="{465E02F3-C158-4F08-9ACA-854467DE1800}" type="datetimeFigureOut">
               <a:rPr lang="zh-CN" altLang="en-US" smtClean="0"/>
-              <a:t>2017/9/16</a:t>
+              <a:t>2017/11/24</a:t>
             </a:fld>
             <a:endParaRPr lang="zh-CN" altLang="en-US"/>
           </a:p>
@@ -1011,7 +1013,7 @@
           <a:p>
             <a:fld id="{465E02F3-C158-4F08-9ACA-854467DE1800}" type="datetimeFigureOut">
               <a:rPr lang="zh-CN" altLang="en-US" smtClean="0"/>
-              <a:t>2017/9/16</a:t>
+              <a:t>2017/11/24</a:t>
             </a:fld>
             <a:endParaRPr lang="zh-CN" altLang="en-US"/>
           </a:p>
@@ -1243,7 +1245,7 @@
           <a:p>
             <a:fld id="{465E02F3-C158-4F08-9ACA-854467DE1800}" type="datetimeFigureOut">
               <a:rPr lang="zh-CN" altLang="en-US" smtClean="0"/>
-              <a:t>2017/9/16</a:t>
+              <a:t>2017/11/24</a:t>
             </a:fld>
             <a:endParaRPr lang="zh-CN" altLang="en-US"/>
           </a:p>
@@ -1610,7 +1612,7 @@
           <a:p>
             <a:fld id="{465E02F3-C158-4F08-9ACA-854467DE1800}" type="datetimeFigureOut">
               <a:rPr lang="zh-CN" altLang="en-US" smtClean="0"/>
-              <a:t>2017/9/16</a:t>
+              <a:t>2017/11/24</a:t>
             </a:fld>
             <a:endParaRPr lang="zh-CN" altLang="en-US"/>
           </a:p>
@@ -1728,7 +1730,7 @@
           <a:p>
             <a:fld id="{465E02F3-C158-4F08-9ACA-854467DE1800}" type="datetimeFigureOut">
               <a:rPr lang="zh-CN" altLang="en-US" smtClean="0"/>
-              <a:t>2017/9/16</a:t>
+              <a:t>2017/11/24</a:t>
             </a:fld>
             <a:endParaRPr lang="zh-CN" altLang="en-US"/>
           </a:p>
@@ -1823,7 +1825,7 @@
           <a:p>
             <a:fld id="{465E02F3-C158-4F08-9ACA-854467DE1800}" type="datetimeFigureOut">
               <a:rPr lang="zh-CN" altLang="en-US" smtClean="0"/>
-              <a:t>2017/9/16</a:t>
+              <a:t>2017/11/24</a:t>
             </a:fld>
             <a:endParaRPr lang="zh-CN" altLang="en-US"/>
           </a:p>
@@ -2100,7 +2102,7 @@
           <a:p>
             <a:fld id="{465E02F3-C158-4F08-9ACA-854467DE1800}" type="datetimeFigureOut">
               <a:rPr lang="zh-CN" altLang="en-US" smtClean="0"/>
-              <a:t>2017/9/16</a:t>
+              <a:t>2017/11/24</a:t>
             </a:fld>
             <a:endParaRPr lang="zh-CN" altLang="en-US"/>
           </a:p>
@@ -2353,7 +2355,7 @@
           <a:p>
             <a:fld id="{465E02F3-C158-4F08-9ACA-854467DE1800}" type="datetimeFigureOut">
               <a:rPr lang="zh-CN" altLang="en-US" smtClean="0"/>
-              <a:t>2017/9/16</a:t>
+              <a:t>2017/11/24</a:t>
             </a:fld>
             <a:endParaRPr lang="zh-CN" altLang="en-US"/>
           </a:p>
@@ -2566,7 +2568,7 @@
           <a:p>
             <a:fld id="{465E02F3-C158-4F08-9ACA-854467DE1800}" type="datetimeFigureOut">
               <a:rPr lang="zh-CN" altLang="en-US" smtClean="0"/>
-              <a:t>2017/9/16</a:t>
+              <a:t>2017/11/24</a:t>
             </a:fld>
             <a:endParaRPr lang="zh-CN" altLang="en-US"/>
           </a:p>
@@ -5356,6 +5358,1270 @@
 </p:sld>
 </file>
 
+<file path=ppt/slides/slide4.xml><?xml version="1.0" encoding="utf-8"?>
+<p:sld xmlns:a="http://schemas.openxmlformats.org/drawingml/2006/main" xmlns:r="http://schemas.openxmlformats.org/officeDocument/2006/relationships" xmlns:p="http://schemas.openxmlformats.org/presentationml/2006/main">
+  <p:cSld>
+    <p:spTree>
+      <p:nvGrpSpPr>
+        <p:cNvPr id="1" name=""/>
+        <p:cNvGrpSpPr/>
+        <p:nvPr/>
+      </p:nvGrpSpPr>
+      <p:grpSpPr>
+        <a:xfrm>
+          <a:off x="0" y="0"/>
+          <a:ext cx="0" cy="0"/>
+          <a:chOff x="0" y="0"/>
+          <a:chExt cx="0" cy="0"/>
+        </a:xfrm>
+      </p:grpSpPr>
+      <p:sp>
+        <p:nvSpPr>
+          <p:cNvPr id="4" name="椭圆 3"/>
+          <p:cNvSpPr/>
+          <p:nvPr/>
+        </p:nvSpPr>
+        <p:spPr>
+          <a:xfrm>
+            <a:off x="715224" y="1973655"/>
+            <a:ext cx="1213164" cy="769544"/>
+          </a:xfrm>
+          <a:prstGeom prst="ellipse">
+            <a:avLst/>
+          </a:prstGeom>
+        </p:spPr>
+        <p:style>
+          <a:lnRef idx="2">
+            <a:schemeClr val="accent1">
+              <a:shade val="50000"/>
+            </a:schemeClr>
+          </a:lnRef>
+          <a:fillRef idx="1">
+            <a:schemeClr val="accent1"/>
+          </a:fillRef>
+          <a:effectRef idx="0">
+            <a:schemeClr val="accent1"/>
+          </a:effectRef>
+          <a:fontRef idx="minor">
+            <a:schemeClr val="lt1"/>
+          </a:fontRef>
+        </p:style>
+        <p:txBody>
+          <a:bodyPr rtlCol="0" anchor="ctr"/>
+          <a:lstStyle/>
+          <a:p>
+            <a:pPr algn="ctr"/>
+            <a:r>
+              <a:rPr lang="en-US" altLang="zh-CN" sz="1400" dirty="0" err="1" smtClean="0"/>
+              <a:t>CameraMan</a:t>
+            </a:r>
+            <a:r>
+              <a:rPr lang="en-US" altLang="zh-CN" sz="1400" dirty="0" err="1" smtClean="0"/>
+              <a:t>a</a:t>
+            </a:r>
+            <a:r>
+              <a:rPr lang="en-US" altLang="zh-CN" sz="1400" dirty="0" err="1" smtClean="0"/>
+              <a:t>ger</a:t>
+            </a:r>
+            <a:endParaRPr lang="zh-CN" altLang="en-US" sz="1400" dirty="0"/>
+          </a:p>
+        </p:txBody>
+      </p:sp>
+      <p:sp>
+        <p:nvSpPr>
+          <p:cNvPr id="5" name="圆角矩形 4"/>
+          <p:cNvSpPr/>
+          <p:nvPr/>
+        </p:nvSpPr>
+        <p:spPr>
+          <a:xfrm>
+            <a:off x="2697933" y="1937441"/>
+            <a:ext cx="1692998" cy="805758"/>
+          </a:xfrm>
+          <a:prstGeom prst="roundRect">
+            <a:avLst/>
+          </a:prstGeom>
+        </p:spPr>
+        <p:style>
+          <a:lnRef idx="2">
+            <a:schemeClr val="accent1">
+              <a:shade val="50000"/>
+            </a:schemeClr>
+          </a:lnRef>
+          <a:fillRef idx="1">
+            <a:schemeClr val="accent1"/>
+          </a:fillRef>
+          <a:effectRef idx="0">
+            <a:schemeClr val="accent1"/>
+          </a:effectRef>
+          <a:fontRef idx="minor">
+            <a:schemeClr val="lt1"/>
+          </a:fontRef>
+        </p:style>
+        <p:txBody>
+          <a:bodyPr rtlCol="0" anchor="ctr"/>
+          <a:lstStyle/>
+          <a:p>
+            <a:pPr algn="ctr"/>
+            <a:r>
+              <a:rPr lang="en-US" altLang="zh-CN" dirty="0" err="1" smtClean="0"/>
+              <a:t>CameraCharacteristics</a:t>
+            </a:r>
+            <a:endParaRPr lang="zh-CN" altLang="en-US" dirty="0"/>
+          </a:p>
+        </p:txBody>
+      </p:sp>
+      <p:sp>
+        <p:nvSpPr>
+          <p:cNvPr id="10" name="圆角矩形 9"/>
+          <p:cNvSpPr/>
+          <p:nvPr/>
+        </p:nvSpPr>
+        <p:spPr>
+          <a:xfrm>
+            <a:off x="5160476" y="1937441"/>
+            <a:ext cx="1692998" cy="805758"/>
+          </a:xfrm>
+          <a:prstGeom prst="roundRect">
+            <a:avLst/>
+          </a:prstGeom>
+        </p:spPr>
+        <p:style>
+          <a:lnRef idx="2">
+            <a:schemeClr val="accent1">
+              <a:shade val="50000"/>
+            </a:schemeClr>
+          </a:lnRef>
+          <a:fillRef idx="1">
+            <a:schemeClr val="accent1"/>
+          </a:fillRef>
+          <a:effectRef idx="0">
+            <a:schemeClr val="accent1"/>
+          </a:effectRef>
+          <a:fontRef idx="minor">
+            <a:schemeClr val="lt1"/>
+          </a:fontRef>
+        </p:style>
+        <p:txBody>
+          <a:bodyPr rtlCol="0" anchor="ctr"/>
+          <a:lstStyle/>
+          <a:p>
+            <a:pPr algn="ctr"/>
+            <a:r>
+              <a:rPr lang="en-US" altLang="zh-CN" dirty="0" err="1" smtClean="0"/>
+              <a:t>CameraCharacteristicsParser</a:t>
+            </a:r>
+            <a:endParaRPr lang="en-US" altLang="zh-CN" dirty="0" smtClean="0"/>
+          </a:p>
+        </p:txBody>
+      </p:sp>
+      <p:cxnSp>
+        <p:nvCxnSpPr>
+          <p:cNvPr id="12" name="直接箭头连接符 11"/>
+          <p:cNvCxnSpPr>
+            <a:stCxn id="4" idx="6"/>
+            <a:endCxn id="5" idx="1"/>
+          </p:cNvCxnSpPr>
+          <p:nvPr/>
+        </p:nvCxnSpPr>
+        <p:spPr>
+          <a:xfrm flipV="1">
+            <a:off x="1928388" y="2340320"/>
+            <a:ext cx="769545" cy="18107"/>
+          </a:xfrm>
+          <a:prstGeom prst="straightConnector1">
+            <a:avLst/>
+          </a:prstGeom>
+          <a:ln>
+            <a:tailEnd type="triangle"/>
+          </a:ln>
+        </p:spPr>
+        <p:style>
+          <a:lnRef idx="1">
+            <a:schemeClr val="accent1"/>
+          </a:lnRef>
+          <a:fillRef idx="0">
+            <a:schemeClr val="accent1"/>
+          </a:fillRef>
+          <a:effectRef idx="0">
+            <a:schemeClr val="accent1"/>
+          </a:effectRef>
+          <a:fontRef idx="minor">
+            <a:schemeClr val="tx1"/>
+          </a:fontRef>
+        </p:style>
+      </p:cxnSp>
+      <p:cxnSp>
+        <p:nvCxnSpPr>
+          <p:cNvPr id="14" name="直接箭头连接符 13"/>
+          <p:cNvCxnSpPr>
+            <a:stCxn id="5" idx="3"/>
+            <a:endCxn id="10" idx="1"/>
+          </p:cNvCxnSpPr>
+          <p:nvPr/>
+        </p:nvCxnSpPr>
+        <p:spPr>
+          <a:xfrm>
+            <a:off x="4390931" y="2340320"/>
+            <a:ext cx="769545" cy="0"/>
+          </a:xfrm>
+          <a:prstGeom prst="straightConnector1">
+            <a:avLst/>
+          </a:prstGeom>
+          <a:ln>
+            <a:tailEnd type="triangle"/>
+          </a:ln>
+        </p:spPr>
+        <p:style>
+          <a:lnRef idx="1">
+            <a:schemeClr val="accent1"/>
+          </a:lnRef>
+          <a:fillRef idx="0">
+            <a:schemeClr val="accent1"/>
+          </a:fillRef>
+          <a:effectRef idx="0">
+            <a:schemeClr val="accent1"/>
+          </a:effectRef>
+          <a:fontRef idx="minor">
+            <a:schemeClr val="tx1"/>
+          </a:fontRef>
+        </p:style>
+      </p:cxnSp>
+      <p:sp>
+        <p:nvSpPr>
+          <p:cNvPr id="16" name="圆角矩形 15"/>
+          <p:cNvSpPr/>
+          <p:nvPr/>
+        </p:nvSpPr>
+        <p:spPr>
+          <a:xfrm>
+            <a:off x="7541537" y="1937441"/>
+            <a:ext cx="1692998" cy="805758"/>
+          </a:xfrm>
+          <a:prstGeom prst="roundRect">
+            <a:avLst/>
+          </a:prstGeom>
+        </p:spPr>
+        <p:style>
+          <a:lnRef idx="2">
+            <a:schemeClr val="accent1">
+              <a:shade val="50000"/>
+            </a:schemeClr>
+          </a:lnRef>
+          <a:fillRef idx="1">
+            <a:schemeClr val="accent1"/>
+          </a:fillRef>
+          <a:effectRef idx="0">
+            <a:schemeClr val="accent1"/>
+          </a:effectRef>
+          <a:fontRef idx="minor">
+            <a:schemeClr val="lt1"/>
+          </a:fontRef>
+        </p:style>
+        <p:txBody>
+          <a:bodyPr rtlCol="0" anchor="ctr"/>
+          <a:lstStyle/>
+          <a:p>
+            <a:pPr algn="ctr"/>
+            <a:r>
+              <a:rPr lang="en-US" altLang="zh-CN" dirty="0" smtClean="0"/>
+              <a:t>UI update</a:t>
+            </a:r>
+          </a:p>
+        </p:txBody>
+      </p:sp>
+      <p:cxnSp>
+        <p:nvCxnSpPr>
+          <p:cNvPr id="18" name="直接箭头连接符 17"/>
+          <p:cNvCxnSpPr>
+            <a:stCxn id="10" idx="3"/>
+            <a:endCxn id="16" idx="1"/>
+          </p:cNvCxnSpPr>
+          <p:nvPr/>
+        </p:nvCxnSpPr>
+        <p:spPr>
+          <a:xfrm>
+            <a:off x="6853474" y="2340320"/>
+            <a:ext cx="688063" cy="0"/>
+          </a:xfrm>
+          <a:prstGeom prst="straightConnector1">
+            <a:avLst/>
+          </a:prstGeom>
+          <a:ln>
+            <a:tailEnd type="triangle"/>
+          </a:ln>
+        </p:spPr>
+        <p:style>
+          <a:lnRef idx="1">
+            <a:schemeClr val="accent1"/>
+          </a:lnRef>
+          <a:fillRef idx="0">
+            <a:schemeClr val="accent1"/>
+          </a:fillRef>
+          <a:effectRef idx="0">
+            <a:schemeClr val="accent1"/>
+          </a:effectRef>
+          <a:fontRef idx="minor">
+            <a:schemeClr val="tx1"/>
+          </a:fontRef>
+        </p:style>
+      </p:cxnSp>
+    </p:spTree>
+    <p:extLst>
+      <p:ext uri="{BB962C8B-B14F-4D97-AF65-F5344CB8AC3E}">
+        <p14:creationId xmlns:p14="http://schemas.microsoft.com/office/powerpoint/2010/main" val="1394330324"/>
+      </p:ext>
+    </p:extLst>
+  </p:cSld>
+  <p:clrMapOvr>
+    <a:masterClrMapping/>
+  </p:clrMapOvr>
+</p:sld>
+</file>
+
+<file path=ppt/slides/slide5.xml><?xml version="1.0" encoding="utf-8"?>
+<p:sld xmlns:a="http://schemas.openxmlformats.org/drawingml/2006/main" xmlns:r="http://schemas.openxmlformats.org/officeDocument/2006/relationships" xmlns:p="http://schemas.openxmlformats.org/presentationml/2006/main">
+  <p:cSld>
+    <p:spTree>
+      <p:nvGrpSpPr>
+        <p:cNvPr id="1" name=""/>
+        <p:cNvGrpSpPr/>
+        <p:nvPr/>
+      </p:nvGrpSpPr>
+      <p:grpSpPr>
+        <a:xfrm>
+          <a:off x="0" y="0"/>
+          <a:ext cx="0" cy="0"/>
+          <a:chOff x="0" y="0"/>
+          <a:chExt cx="0" cy="0"/>
+        </a:xfrm>
+      </p:grpSpPr>
+      <p:sp>
+        <p:nvSpPr>
+          <p:cNvPr id="4" name="圆角矩形 3"/>
+          <p:cNvSpPr/>
+          <p:nvPr/>
+        </p:nvSpPr>
+        <p:spPr>
+          <a:xfrm>
+            <a:off x="3485584" y="905346"/>
+            <a:ext cx="1747319" cy="588475"/>
+          </a:xfrm>
+          <a:prstGeom prst="roundRect">
+            <a:avLst/>
+          </a:prstGeom>
+        </p:spPr>
+        <p:style>
+          <a:lnRef idx="2">
+            <a:schemeClr val="accent1">
+              <a:shade val="50000"/>
+            </a:schemeClr>
+          </a:lnRef>
+          <a:fillRef idx="1">
+            <a:schemeClr val="accent1"/>
+          </a:fillRef>
+          <a:effectRef idx="0">
+            <a:schemeClr val="accent1"/>
+          </a:effectRef>
+          <a:fontRef idx="minor">
+            <a:schemeClr val="lt1"/>
+          </a:fontRef>
+        </p:style>
+        <p:txBody>
+          <a:bodyPr rtlCol="0" anchor="ctr"/>
+          <a:lstStyle/>
+          <a:p>
+            <a:pPr algn="ctr"/>
+            <a:r>
+              <a:rPr lang="zh-CN" altLang="en-US" sz="1200" dirty="0" smtClean="0">
+                <a:solidFill>
+                  <a:schemeClr val="bg1"/>
+                </a:solidFill>
+              </a:rPr>
+              <a:t>拍照</a:t>
+            </a:r>
+            <a:endParaRPr lang="en-US" altLang="zh-CN" sz="1200" dirty="0" smtClean="0">
+              <a:solidFill>
+                <a:schemeClr val="bg1"/>
+              </a:solidFill>
+            </a:endParaRPr>
+          </a:p>
+          <a:p>
+            <a:pPr algn="ctr"/>
+            <a:r>
+              <a:rPr lang="en-US" altLang="zh-CN" sz="1200" dirty="0" err="1">
+                <a:solidFill>
+                  <a:schemeClr val="bg1"/>
+                </a:solidFill>
+              </a:rPr>
+              <a:t>createCaptureSession</a:t>
+            </a:r>
+            <a:endParaRPr lang="en-US" altLang="zh-CN" sz="1200" dirty="0" smtClean="0">
+              <a:solidFill>
+                <a:schemeClr val="bg1"/>
+              </a:solidFill>
+            </a:endParaRPr>
+          </a:p>
+        </p:txBody>
+      </p:sp>
+      <p:sp>
+        <p:nvSpPr>
+          <p:cNvPr id="5" name="圆角矩形 4"/>
+          <p:cNvSpPr/>
+          <p:nvPr/>
+        </p:nvSpPr>
+        <p:spPr>
+          <a:xfrm>
+            <a:off x="3485584" y="1702051"/>
+            <a:ext cx="1747319" cy="588475"/>
+          </a:xfrm>
+          <a:prstGeom prst="roundRect">
+            <a:avLst/>
+          </a:prstGeom>
+        </p:spPr>
+        <p:style>
+          <a:lnRef idx="2">
+            <a:schemeClr val="accent1">
+              <a:shade val="50000"/>
+            </a:schemeClr>
+          </a:lnRef>
+          <a:fillRef idx="1">
+            <a:schemeClr val="accent1"/>
+          </a:fillRef>
+          <a:effectRef idx="0">
+            <a:schemeClr val="accent1"/>
+          </a:effectRef>
+          <a:fontRef idx="minor">
+            <a:schemeClr val="lt1"/>
+          </a:fontRef>
+        </p:style>
+        <p:txBody>
+          <a:bodyPr rtlCol="0" anchor="ctr"/>
+          <a:lstStyle/>
+          <a:p>
+            <a:pPr algn="ctr"/>
+            <a:r>
+              <a:rPr lang="zh-CN" altLang="en-US" dirty="0" smtClean="0"/>
+              <a:t>录像</a:t>
+            </a:r>
+            <a:endParaRPr lang="en-US" altLang="zh-CN" dirty="0" smtClean="0"/>
+          </a:p>
+        </p:txBody>
+      </p:sp>
+      <p:sp>
+        <p:nvSpPr>
+          <p:cNvPr id="6" name="圆角矩形 5"/>
+          <p:cNvSpPr/>
+          <p:nvPr/>
+        </p:nvSpPr>
+        <p:spPr>
+          <a:xfrm>
+            <a:off x="3485584" y="2498756"/>
+            <a:ext cx="1747319" cy="588475"/>
+          </a:xfrm>
+          <a:prstGeom prst="roundRect">
+            <a:avLst/>
+          </a:prstGeom>
+        </p:spPr>
+        <p:style>
+          <a:lnRef idx="3">
+            <a:schemeClr val="lt1"/>
+          </a:lnRef>
+          <a:fillRef idx="1">
+            <a:schemeClr val="accent6"/>
+          </a:fillRef>
+          <a:effectRef idx="1">
+            <a:schemeClr val="accent6"/>
+          </a:effectRef>
+          <a:fontRef idx="minor">
+            <a:schemeClr val="lt1"/>
+          </a:fontRef>
+        </p:style>
+        <p:txBody>
+          <a:bodyPr rtlCol="0" anchor="ctr"/>
+          <a:lstStyle/>
+          <a:p>
+            <a:pPr algn="ctr"/>
+            <a:r>
+              <a:rPr lang="zh-CN" altLang="en-US" sz="1400" dirty="0" smtClean="0"/>
+              <a:t>高速录像</a:t>
+            </a:r>
+            <a:r>
+              <a:rPr lang="en-US" altLang="zh-CN" sz="1400" dirty="0"/>
+              <a:t> (&gt;=120fps)</a:t>
+            </a:r>
+            <a:endParaRPr lang="en-US" altLang="zh-CN" sz="1400" dirty="0" smtClean="0"/>
+          </a:p>
+        </p:txBody>
+      </p:sp>
+      <p:sp>
+        <p:nvSpPr>
+          <p:cNvPr id="7" name="圆角矩形 6"/>
+          <p:cNvSpPr/>
+          <p:nvPr/>
+        </p:nvSpPr>
+        <p:spPr>
+          <a:xfrm>
+            <a:off x="3485584" y="3385995"/>
+            <a:ext cx="1747319" cy="588475"/>
+          </a:xfrm>
+          <a:prstGeom prst="roundRect">
+            <a:avLst/>
+          </a:prstGeom>
+        </p:spPr>
+        <p:style>
+          <a:lnRef idx="2">
+            <a:schemeClr val="accent1">
+              <a:shade val="50000"/>
+            </a:schemeClr>
+          </a:lnRef>
+          <a:fillRef idx="1">
+            <a:schemeClr val="accent1"/>
+          </a:fillRef>
+          <a:effectRef idx="0">
+            <a:schemeClr val="accent1"/>
+          </a:effectRef>
+          <a:fontRef idx="minor">
+            <a:schemeClr val="lt1"/>
+          </a:fontRef>
+        </p:style>
+        <p:txBody>
+          <a:bodyPr rtlCol="0" anchor="ctr"/>
+          <a:lstStyle/>
+          <a:p>
+            <a:pPr algn="ctr"/>
+            <a:r>
+              <a:rPr lang="zh-CN" altLang="en-US" dirty="0" smtClean="0"/>
+              <a:t>连拍</a:t>
+            </a:r>
+            <a:endParaRPr lang="en-US" altLang="zh-CN" dirty="0" smtClean="0"/>
+          </a:p>
+        </p:txBody>
+      </p:sp>
+      <p:sp>
+        <p:nvSpPr>
+          <p:cNvPr id="12" name="圆角矩形 11"/>
+          <p:cNvSpPr/>
+          <p:nvPr/>
+        </p:nvSpPr>
+        <p:spPr>
+          <a:xfrm>
+            <a:off x="742384" y="1421394"/>
+            <a:ext cx="1747319" cy="588475"/>
+          </a:xfrm>
+          <a:prstGeom prst="roundRect">
+            <a:avLst/>
+          </a:prstGeom>
+        </p:spPr>
+        <p:style>
+          <a:lnRef idx="2">
+            <a:schemeClr val="accent1">
+              <a:shade val="50000"/>
+            </a:schemeClr>
+          </a:lnRef>
+          <a:fillRef idx="1">
+            <a:schemeClr val="accent1"/>
+          </a:fillRef>
+          <a:effectRef idx="0">
+            <a:schemeClr val="accent1"/>
+          </a:effectRef>
+          <a:fontRef idx="minor">
+            <a:schemeClr val="lt1"/>
+          </a:fontRef>
+        </p:style>
+        <p:txBody>
+          <a:bodyPr rtlCol="0" anchor="ctr"/>
+          <a:lstStyle/>
+          <a:p>
+            <a:pPr algn="ctr"/>
+            <a:r>
+              <a:rPr lang="zh-CN" altLang="en-US" dirty="0" smtClean="0"/>
+              <a:t>双摄</a:t>
+            </a:r>
+            <a:endParaRPr lang="en-US" altLang="zh-CN" dirty="0" smtClean="0"/>
+          </a:p>
+        </p:txBody>
+      </p:sp>
+      <p:sp>
+        <p:nvSpPr>
+          <p:cNvPr id="13" name="圆角矩形 12"/>
+          <p:cNvSpPr/>
+          <p:nvPr/>
+        </p:nvSpPr>
+        <p:spPr>
+          <a:xfrm>
+            <a:off x="742384" y="2218099"/>
+            <a:ext cx="1747319" cy="588475"/>
+          </a:xfrm>
+          <a:prstGeom prst="roundRect">
+            <a:avLst/>
+          </a:prstGeom>
+        </p:spPr>
+        <p:style>
+          <a:lnRef idx="2">
+            <a:schemeClr val="accent1">
+              <a:shade val="50000"/>
+            </a:schemeClr>
+          </a:lnRef>
+          <a:fillRef idx="1">
+            <a:schemeClr val="accent1"/>
+          </a:fillRef>
+          <a:effectRef idx="0">
+            <a:schemeClr val="accent1"/>
+          </a:effectRef>
+          <a:fontRef idx="minor">
+            <a:schemeClr val="lt1"/>
+          </a:fontRef>
+        </p:style>
+        <p:txBody>
+          <a:bodyPr rtlCol="0" anchor="ctr"/>
+          <a:lstStyle/>
+          <a:p>
+            <a:pPr algn="ctr"/>
+            <a:r>
+              <a:rPr lang="zh-CN" altLang="en-US" dirty="0" smtClean="0"/>
+              <a:t>后摄</a:t>
+            </a:r>
+            <a:endParaRPr lang="en-US" altLang="zh-CN" dirty="0" smtClean="0"/>
+          </a:p>
+        </p:txBody>
+      </p:sp>
+      <p:sp>
+        <p:nvSpPr>
+          <p:cNvPr id="14" name="圆角矩形 13"/>
+          <p:cNvSpPr/>
+          <p:nvPr/>
+        </p:nvSpPr>
+        <p:spPr>
+          <a:xfrm>
+            <a:off x="742384" y="3014804"/>
+            <a:ext cx="1747319" cy="588475"/>
+          </a:xfrm>
+          <a:prstGeom prst="roundRect">
+            <a:avLst/>
+          </a:prstGeom>
+        </p:spPr>
+        <p:style>
+          <a:lnRef idx="2">
+            <a:schemeClr val="accent1">
+              <a:shade val="50000"/>
+            </a:schemeClr>
+          </a:lnRef>
+          <a:fillRef idx="1">
+            <a:schemeClr val="accent1"/>
+          </a:fillRef>
+          <a:effectRef idx="0">
+            <a:schemeClr val="accent1"/>
+          </a:effectRef>
+          <a:fontRef idx="minor">
+            <a:schemeClr val="lt1"/>
+          </a:fontRef>
+        </p:style>
+        <p:txBody>
+          <a:bodyPr rtlCol="0" anchor="ctr"/>
+          <a:lstStyle/>
+          <a:p>
+            <a:pPr algn="ctr"/>
+            <a:r>
+              <a:rPr lang="zh-CN" altLang="en-US" dirty="0" smtClean="0"/>
+              <a:t>前摄</a:t>
+            </a:r>
+            <a:endParaRPr lang="en-US" altLang="zh-CN" dirty="0" smtClean="0"/>
+          </a:p>
+        </p:txBody>
+      </p:sp>
+      <p:cxnSp>
+        <p:nvCxnSpPr>
+          <p:cNvPr id="19" name="直接箭头连接符 18"/>
+          <p:cNvCxnSpPr>
+            <a:stCxn id="12" idx="3"/>
+            <a:endCxn id="4" idx="1"/>
+          </p:cNvCxnSpPr>
+          <p:nvPr/>
+        </p:nvCxnSpPr>
+        <p:spPr>
+          <a:xfrm flipV="1">
+            <a:off x="2489703" y="1199584"/>
+            <a:ext cx="995881" cy="516048"/>
+          </a:xfrm>
+          <a:prstGeom prst="straightConnector1">
+            <a:avLst/>
+          </a:prstGeom>
+          <a:ln>
+            <a:tailEnd type="triangle"/>
+          </a:ln>
+        </p:spPr>
+        <p:style>
+          <a:lnRef idx="1">
+            <a:schemeClr val="accent1"/>
+          </a:lnRef>
+          <a:fillRef idx="0">
+            <a:schemeClr val="accent1"/>
+          </a:fillRef>
+          <a:effectRef idx="0">
+            <a:schemeClr val="accent1"/>
+          </a:effectRef>
+          <a:fontRef idx="minor">
+            <a:schemeClr val="tx1"/>
+          </a:fontRef>
+        </p:style>
+      </p:cxnSp>
+      <p:cxnSp>
+        <p:nvCxnSpPr>
+          <p:cNvPr id="22" name="直接箭头连接符 21"/>
+          <p:cNvCxnSpPr>
+            <a:stCxn id="13" idx="3"/>
+            <a:endCxn id="4" idx="1"/>
+          </p:cNvCxnSpPr>
+          <p:nvPr/>
+        </p:nvCxnSpPr>
+        <p:spPr>
+          <a:xfrm flipV="1">
+            <a:off x="2489703" y="1199584"/>
+            <a:ext cx="995881" cy="1312753"/>
+          </a:xfrm>
+          <a:prstGeom prst="straightConnector1">
+            <a:avLst/>
+          </a:prstGeom>
+          <a:ln>
+            <a:tailEnd type="triangle"/>
+          </a:ln>
+        </p:spPr>
+        <p:style>
+          <a:lnRef idx="1">
+            <a:schemeClr val="accent1"/>
+          </a:lnRef>
+          <a:fillRef idx="0">
+            <a:schemeClr val="accent1"/>
+          </a:fillRef>
+          <a:effectRef idx="0">
+            <a:schemeClr val="accent1"/>
+          </a:effectRef>
+          <a:fontRef idx="minor">
+            <a:schemeClr val="tx1"/>
+          </a:fontRef>
+        </p:style>
+      </p:cxnSp>
+      <p:cxnSp>
+        <p:nvCxnSpPr>
+          <p:cNvPr id="24" name="直接箭头连接符 23"/>
+          <p:cNvCxnSpPr>
+            <a:stCxn id="13" idx="3"/>
+            <a:endCxn id="5" idx="1"/>
+          </p:cNvCxnSpPr>
+          <p:nvPr/>
+        </p:nvCxnSpPr>
+        <p:spPr>
+          <a:xfrm flipV="1">
+            <a:off x="2489703" y="1996289"/>
+            <a:ext cx="995881" cy="516048"/>
+          </a:xfrm>
+          <a:prstGeom prst="straightConnector1">
+            <a:avLst/>
+          </a:prstGeom>
+          <a:ln>
+            <a:tailEnd type="triangle"/>
+          </a:ln>
+        </p:spPr>
+        <p:style>
+          <a:lnRef idx="1">
+            <a:schemeClr val="accent1"/>
+          </a:lnRef>
+          <a:fillRef idx="0">
+            <a:schemeClr val="accent1"/>
+          </a:fillRef>
+          <a:effectRef idx="0">
+            <a:schemeClr val="accent1"/>
+          </a:effectRef>
+          <a:fontRef idx="minor">
+            <a:schemeClr val="tx1"/>
+          </a:fontRef>
+        </p:style>
+      </p:cxnSp>
+      <p:cxnSp>
+        <p:nvCxnSpPr>
+          <p:cNvPr id="27" name="直接箭头连接符 26"/>
+          <p:cNvCxnSpPr>
+            <a:stCxn id="13" idx="3"/>
+            <a:endCxn id="6" idx="1"/>
+          </p:cNvCxnSpPr>
+          <p:nvPr/>
+        </p:nvCxnSpPr>
+        <p:spPr>
+          <a:xfrm>
+            <a:off x="2489703" y="2512337"/>
+            <a:ext cx="995881" cy="280657"/>
+          </a:xfrm>
+          <a:prstGeom prst="straightConnector1">
+            <a:avLst/>
+          </a:prstGeom>
+          <a:ln>
+            <a:tailEnd type="triangle"/>
+          </a:ln>
+        </p:spPr>
+        <p:style>
+          <a:lnRef idx="1">
+            <a:schemeClr val="accent1"/>
+          </a:lnRef>
+          <a:fillRef idx="0">
+            <a:schemeClr val="accent1"/>
+          </a:fillRef>
+          <a:effectRef idx="0">
+            <a:schemeClr val="accent1"/>
+          </a:effectRef>
+          <a:fontRef idx="minor">
+            <a:schemeClr val="tx1"/>
+          </a:fontRef>
+        </p:style>
+      </p:cxnSp>
+      <p:cxnSp>
+        <p:nvCxnSpPr>
+          <p:cNvPr id="30" name="直接箭头连接符 29"/>
+          <p:cNvCxnSpPr>
+            <a:stCxn id="13" idx="3"/>
+            <a:endCxn id="7" idx="1"/>
+          </p:cNvCxnSpPr>
+          <p:nvPr/>
+        </p:nvCxnSpPr>
+        <p:spPr>
+          <a:xfrm>
+            <a:off x="2489703" y="2512337"/>
+            <a:ext cx="995881" cy="1167896"/>
+          </a:xfrm>
+          <a:prstGeom prst="straightConnector1">
+            <a:avLst/>
+          </a:prstGeom>
+          <a:ln>
+            <a:tailEnd type="triangle"/>
+          </a:ln>
+        </p:spPr>
+        <p:style>
+          <a:lnRef idx="1">
+            <a:schemeClr val="accent1"/>
+          </a:lnRef>
+          <a:fillRef idx="0">
+            <a:schemeClr val="accent1"/>
+          </a:fillRef>
+          <a:effectRef idx="0">
+            <a:schemeClr val="accent1"/>
+          </a:effectRef>
+          <a:fontRef idx="minor">
+            <a:schemeClr val="tx1"/>
+          </a:fontRef>
+        </p:style>
+      </p:cxnSp>
+      <p:cxnSp>
+        <p:nvCxnSpPr>
+          <p:cNvPr id="32" name="直接箭头连接符 31"/>
+          <p:cNvCxnSpPr>
+            <a:stCxn id="14" idx="3"/>
+            <a:endCxn id="4" idx="1"/>
+          </p:cNvCxnSpPr>
+          <p:nvPr/>
+        </p:nvCxnSpPr>
+        <p:spPr>
+          <a:xfrm flipV="1">
+            <a:off x="2489703" y="1199584"/>
+            <a:ext cx="995881" cy="2109458"/>
+          </a:xfrm>
+          <a:prstGeom prst="straightConnector1">
+            <a:avLst/>
+          </a:prstGeom>
+          <a:ln>
+            <a:tailEnd type="triangle"/>
+          </a:ln>
+        </p:spPr>
+        <p:style>
+          <a:lnRef idx="1">
+            <a:schemeClr val="accent1"/>
+          </a:lnRef>
+          <a:fillRef idx="0">
+            <a:schemeClr val="accent1"/>
+          </a:fillRef>
+          <a:effectRef idx="0">
+            <a:schemeClr val="accent1"/>
+          </a:effectRef>
+          <a:fontRef idx="minor">
+            <a:schemeClr val="tx1"/>
+          </a:fontRef>
+        </p:style>
+      </p:cxnSp>
+      <p:cxnSp>
+        <p:nvCxnSpPr>
+          <p:cNvPr id="34" name="直接箭头连接符 33"/>
+          <p:cNvCxnSpPr>
+            <a:stCxn id="14" idx="3"/>
+            <a:endCxn id="5" idx="1"/>
+          </p:cNvCxnSpPr>
+          <p:nvPr/>
+        </p:nvCxnSpPr>
+        <p:spPr>
+          <a:xfrm flipV="1">
+            <a:off x="2489703" y="1996289"/>
+            <a:ext cx="995881" cy="1312753"/>
+          </a:xfrm>
+          <a:prstGeom prst="straightConnector1">
+            <a:avLst/>
+          </a:prstGeom>
+          <a:ln>
+            <a:tailEnd type="triangle"/>
+          </a:ln>
+        </p:spPr>
+        <p:style>
+          <a:lnRef idx="1">
+            <a:schemeClr val="accent1"/>
+          </a:lnRef>
+          <a:fillRef idx="0">
+            <a:schemeClr val="accent1"/>
+          </a:fillRef>
+          <a:effectRef idx="0">
+            <a:schemeClr val="accent1"/>
+          </a:effectRef>
+          <a:fontRef idx="minor">
+            <a:schemeClr val="tx1"/>
+          </a:fontRef>
+        </p:style>
+      </p:cxnSp>
+      <p:cxnSp>
+        <p:nvCxnSpPr>
+          <p:cNvPr id="36" name="直接箭头连接符 35"/>
+          <p:cNvCxnSpPr>
+            <a:stCxn id="7" idx="1"/>
+            <a:endCxn id="14" idx="3"/>
+          </p:cNvCxnSpPr>
+          <p:nvPr/>
+        </p:nvCxnSpPr>
+        <p:spPr>
+          <a:xfrm flipH="1" flipV="1">
+            <a:off x="2489703" y="3309042"/>
+            <a:ext cx="995881" cy="371191"/>
+          </a:xfrm>
+          <a:prstGeom prst="straightConnector1">
+            <a:avLst/>
+          </a:prstGeom>
+          <a:ln>
+            <a:tailEnd type="triangle"/>
+          </a:ln>
+        </p:spPr>
+        <p:style>
+          <a:lnRef idx="1">
+            <a:schemeClr val="accent1"/>
+          </a:lnRef>
+          <a:fillRef idx="0">
+            <a:schemeClr val="accent1"/>
+          </a:fillRef>
+          <a:effectRef idx="0">
+            <a:schemeClr val="accent1"/>
+          </a:effectRef>
+          <a:fontRef idx="minor">
+            <a:schemeClr val="tx1"/>
+          </a:fontRef>
+        </p:style>
+      </p:cxnSp>
+      <p:sp>
+        <p:nvSpPr>
+          <p:cNvPr id="39" name="文本框 38"/>
+          <p:cNvSpPr txBox="1"/>
+          <p:nvPr/>
+        </p:nvSpPr>
+        <p:spPr>
+          <a:xfrm>
+            <a:off x="1140737" y="280658"/>
+            <a:ext cx="1131683" cy="369332"/>
+          </a:xfrm>
+          <a:prstGeom prst="rect">
+            <a:avLst/>
+          </a:prstGeom>
+          <a:noFill/>
+        </p:spPr>
+        <p:txBody>
+          <a:bodyPr wrap="square" rtlCol="0">
+            <a:spAutoFit/>
+          </a:bodyPr>
+          <a:lstStyle/>
+          <a:p>
+            <a:r>
+              <a:rPr lang="en-US" altLang="zh-CN" dirty="0" smtClean="0"/>
+              <a:t>camera</a:t>
+            </a:r>
+            <a:endParaRPr lang="zh-CN" altLang="en-US" dirty="0"/>
+          </a:p>
+        </p:txBody>
+      </p:sp>
+      <p:sp>
+        <p:nvSpPr>
+          <p:cNvPr id="40" name="文本框 39"/>
+          <p:cNvSpPr txBox="1"/>
+          <p:nvPr/>
+        </p:nvSpPr>
+        <p:spPr>
+          <a:xfrm>
+            <a:off x="3892988" y="280658"/>
+            <a:ext cx="1131683" cy="369332"/>
+          </a:xfrm>
+          <a:prstGeom prst="rect">
+            <a:avLst/>
+          </a:prstGeom>
+          <a:noFill/>
+        </p:spPr>
+        <p:txBody>
+          <a:bodyPr wrap="square" rtlCol="0">
+            <a:spAutoFit/>
+          </a:bodyPr>
+          <a:lstStyle/>
+          <a:p>
+            <a:r>
+              <a:rPr lang="en-US" altLang="zh-CN" dirty="0" smtClean="0"/>
+              <a:t>session</a:t>
+            </a:r>
+            <a:endParaRPr lang="zh-CN" altLang="en-US" dirty="0"/>
+          </a:p>
+        </p:txBody>
+      </p:sp>
+      <p:sp>
+        <p:nvSpPr>
+          <p:cNvPr id="41" name="文本框 40"/>
+          <p:cNvSpPr txBox="1"/>
+          <p:nvPr/>
+        </p:nvSpPr>
+        <p:spPr>
+          <a:xfrm>
+            <a:off x="6536600" y="280659"/>
+            <a:ext cx="1131683" cy="369332"/>
+          </a:xfrm>
+          <a:prstGeom prst="rect">
+            <a:avLst/>
+          </a:prstGeom>
+          <a:noFill/>
+        </p:spPr>
+        <p:txBody>
+          <a:bodyPr wrap="square" rtlCol="0">
+            <a:spAutoFit/>
+          </a:bodyPr>
+          <a:lstStyle/>
+          <a:p>
+            <a:r>
+              <a:rPr lang="en-US" altLang="zh-CN" dirty="0" smtClean="0"/>
+              <a:t>request</a:t>
+            </a:r>
+            <a:endParaRPr lang="zh-CN" altLang="en-US" dirty="0"/>
+          </a:p>
+        </p:txBody>
+      </p:sp>
+      <p:sp>
+        <p:nvSpPr>
+          <p:cNvPr id="44" name="文本框 43"/>
+          <p:cNvSpPr txBox="1"/>
+          <p:nvPr/>
+        </p:nvSpPr>
+        <p:spPr>
+          <a:xfrm>
+            <a:off x="443621" y="5232903"/>
+            <a:ext cx="10701196" cy="923330"/>
+          </a:xfrm>
+          <a:prstGeom prst="rect">
+            <a:avLst/>
+          </a:prstGeom>
+          <a:noFill/>
+        </p:spPr>
+        <p:txBody>
+          <a:bodyPr wrap="square" rtlCol="0">
+            <a:spAutoFit/>
+          </a:bodyPr>
+          <a:lstStyle/>
+          <a:p>
+            <a:r>
+              <a:rPr lang="zh-CN" altLang="en-US" dirty="0" smtClean="0"/>
+              <a:t>注：</a:t>
+            </a:r>
+            <a:endParaRPr lang="en-US" altLang="zh-CN" dirty="0" smtClean="0"/>
+          </a:p>
+          <a:p>
+            <a:r>
+              <a:rPr lang="en-US" altLang="zh-CN" dirty="0" smtClean="0"/>
+              <a:t>REQUEST_AVAILABLE_CAPABILITIES </a:t>
+            </a:r>
+            <a:r>
+              <a:rPr lang="zh-CN" altLang="en-US" dirty="0" smtClean="0"/>
+              <a:t>包含 </a:t>
+            </a:r>
+            <a:r>
+              <a:rPr lang="en-US" altLang="zh-CN" dirty="0" smtClean="0"/>
+              <a:t>REQUEST_AVAILABLE_CAPABILITIES_CONSTRAINED_HIGH_SPEED_VIDEO</a:t>
+            </a:r>
+            <a:r>
+              <a:rPr lang="zh-CN" altLang="en-US" dirty="0" smtClean="0"/>
+              <a:t>时才支持高速录像</a:t>
+            </a:r>
+            <a:endParaRPr lang="zh-CN" altLang="en-US" dirty="0"/>
+          </a:p>
+        </p:txBody>
+      </p:sp>
+      <p:sp>
+        <p:nvSpPr>
+          <p:cNvPr id="46" name="文本框 45"/>
+          <p:cNvSpPr txBox="1"/>
+          <p:nvPr/>
+        </p:nvSpPr>
+        <p:spPr>
+          <a:xfrm>
+            <a:off x="5450186" y="2633669"/>
+            <a:ext cx="6081921" cy="307777"/>
+          </a:xfrm>
+          <a:prstGeom prst="rect">
+            <a:avLst/>
+          </a:prstGeom>
+          <a:noFill/>
+        </p:spPr>
+        <p:txBody>
+          <a:bodyPr wrap="none" rtlCol="0">
+            <a:spAutoFit/>
+          </a:bodyPr>
+          <a:lstStyle/>
+          <a:p>
+            <a:r>
+              <a:rPr lang="en-US" altLang="zh-CN" sz="1400" dirty="0" err="1" smtClean="0">
+                <a:hlinkClick r:id="rId2"/>
+              </a:rPr>
+              <a:t>createHighSpeedRequestList</a:t>
+            </a:r>
+            <a:r>
+              <a:rPr lang="en-US" altLang="zh-CN" sz="1400" dirty="0" smtClean="0">
+                <a:hlinkClick r:id="rId2"/>
+              </a:rPr>
+              <a:t>(</a:t>
+            </a:r>
+            <a:r>
+              <a:rPr lang="en-US" altLang="zh-CN" sz="1400" dirty="0" err="1" smtClean="0">
+                <a:hlinkClick r:id="rId2"/>
+              </a:rPr>
+              <a:t>CaptureRequest</a:t>
+            </a:r>
+            <a:r>
+              <a:rPr lang="en-US" altLang="zh-CN" sz="1400" dirty="0" smtClean="0">
+                <a:hlinkClick r:id="rId2"/>
+              </a:rPr>
+              <a:t>)</a:t>
+            </a:r>
+            <a:r>
+              <a:rPr lang="en-US" altLang="zh-CN" sz="1400" dirty="0"/>
+              <a:t>-&gt; </a:t>
+            </a:r>
+            <a:r>
+              <a:rPr lang="en-US" altLang="zh-CN" sz="1400" dirty="0" err="1" smtClean="0"/>
+              <a:t>captureBurst</a:t>
+            </a:r>
+            <a:r>
+              <a:rPr lang="en-US" altLang="zh-CN" sz="1400" dirty="0" smtClean="0"/>
+              <a:t>/</a:t>
+            </a:r>
+            <a:r>
+              <a:rPr lang="en-US" altLang="zh-CN" sz="1400" dirty="0" err="1" smtClean="0"/>
+              <a:t>setRepeatingBurst</a:t>
+            </a:r>
+            <a:endParaRPr lang="en-US" altLang="zh-CN" sz="1400" dirty="0" smtClean="0"/>
+          </a:p>
+        </p:txBody>
+      </p:sp>
+      <p:sp>
+        <p:nvSpPr>
+          <p:cNvPr id="53" name="圆角矩形 52"/>
+          <p:cNvSpPr/>
+          <p:nvPr/>
+        </p:nvSpPr>
+        <p:spPr>
+          <a:xfrm>
+            <a:off x="3485584" y="4250600"/>
+            <a:ext cx="1747319" cy="588475"/>
+          </a:xfrm>
+          <a:prstGeom prst="roundRect">
+            <a:avLst/>
+          </a:prstGeom>
+        </p:spPr>
+        <p:style>
+          <a:lnRef idx="2">
+            <a:schemeClr val="accent1">
+              <a:shade val="50000"/>
+            </a:schemeClr>
+          </a:lnRef>
+          <a:fillRef idx="1">
+            <a:schemeClr val="accent1"/>
+          </a:fillRef>
+          <a:effectRef idx="0">
+            <a:schemeClr val="accent1"/>
+          </a:effectRef>
+          <a:fontRef idx="minor">
+            <a:schemeClr val="lt1"/>
+          </a:fontRef>
+        </p:style>
+        <p:txBody>
+          <a:bodyPr rtlCol="0" anchor="ctr"/>
+          <a:lstStyle/>
+          <a:p>
+            <a:pPr algn="ctr"/>
+            <a:r>
+              <a:rPr lang="zh-CN" altLang="en-US" sz="1200" dirty="0" smtClean="0"/>
+              <a:t>美颜</a:t>
+            </a:r>
+            <a:endParaRPr lang="en-US" altLang="zh-CN" sz="1200" dirty="0" smtClean="0"/>
+          </a:p>
+          <a:p>
+            <a:pPr algn="ctr"/>
+            <a:r>
+              <a:rPr lang="en-US" altLang="zh-CN" sz="1200" dirty="0" err="1"/>
+              <a:t>createReprocessableCaptureSession</a:t>
+            </a:r>
+            <a:r>
+              <a:rPr lang="en-US" altLang="zh-CN" sz="1200" dirty="0"/>
+              <a:t> </a:t>
+            </a:r>
+            <a:endParaRPr lang="en-US" altLang="zh-CN" sz="1200" dirty="0" smtClean="0"/>
+          </a:p>
+        </p:txBody>
+      </p:sp>
+      <p:sp>
+        <p:nvSpPr>
+          <p:cNvPr id="54" name="文本框 53"/>
+          <p:cNvSpPr txBox="1"/>
+          <p:nvPr/>
+        </p:nvSpPr>
+        <p:spPr>
+          <a:xfrm>
+            <a:off x="5993394" y="1199583"/>
+            <a:ext cx="5538713" cy="369332"/>
+          </a:xfrm>
+          <a:prstGeom prst="rect">
+            <a:avLst/>
+          </a:prstGeom>
+          <a:noFill/>
+        </p:spPr>
+        <p:txBody>
+          <a:bodyPr wrap="square" rtlCol="0">
+            <a:spAutoFit/>
+          </a:bodyPr>
+          <a:lstStyle/>
+          <a:p>
+            <a:r>
+              <a:rPr lang="en-US" altLang="zh-CN" dirty="0" smtClean="0"/>
+              <a:t>-&gt;</a:t>
+            </a:r>
+            <a:endParaRPr lang="zh-CN" altLang="en-US" dirty="0"/>
+          </a:p>
+        </p:txBody>
+      </p:sp>
+    </p:spTree>
+    <p:extLst>
+      <p:ext uri="{BB962C8B-B14F-4D97-AF65-F5344CB8AC3E}">
+        <p14:creationId xmlns:p14="http://schemas.microsoft.com/office/powerpoint/2010/main" val="1538237323"/>
+      </p:ext>
+    </p:extLst>
+  </p:cSld>
+  <p:clrMapOvr>
+    <a:masterClrMapping/>
+  </p:clrMapOvr>
+</p:sld>
+</file>
+
 <file path=ppt/theme/theme1.xml><?xml version="1.0" encoding="utf-8"?>
 <a:theme xmlns:a="http://schemas.openxmlformats.org/drawingml/2006/main" name="Office 主题">
   <a:themeElements>

</xml_diff>